<commit_message>
Made minor changes to poster
</commit_message>
<xml_diff>
--- a/docs/Poster/postertemplate2.pptx
+++ b/docs/Poster/postertemplate2.pptx
@@ -238,7 +238,7 @@
           <a:p>
             <a:fld id="{7395F848-6DDA-9042-95D4-0071278BB24B}" type="datetimeFigureOut">
               <a:rPr lang="en-US" smtClean="0"/>
-              <a:t>4/15/2017</a:t>
+              <a:t>4/17/2017</a:t>
             </a:fld>
             <a:endParaRPr lang="en-US"/>
           </a:p>
@@ -1386,7 +1386,7 @@
           <a:p>
             <a:fld id="{56B6BD69-149A-CD41-9E7C-E241C9398BA0}" type="datetimeFigureOut">
               <a:rPr lang="en-US" smtClean="0"/>
-              <a:t>4/15/2017</a:t>
+              <a:t>4/17/2017</a:t>
             </a:fld>
             <a:endParaRPr lang="en-US"/>
           </a:p>
@@ -1564,7 +1564,7 @@
           <a:p>
             <a:fld id="{56B6BD69-149A-CD41-9E7C-E241C9398BA0}" type="datetimeFigureOut">
               <a:rPr lang="en-US" smtClean="0"/>
-              <a:t>4/15/2017</a:t>
+              <a:t>4/17/2017</a:t>
             </a:fld>
             <a:endParaRPr lang="en-US"/>
           </a:p>
@@ -1732,7 +1732,7 @@
           <a:p>
             <a:fld id="{56B6BD69-149A-CD41-9E7C-E241C9398BA0}" type="datetimeFigureOut">
               <a:rPr lang="en-US" smtClean="0"/>
-              <a:t>4/15/2017</a:t>
+              <a:t>4/17/2017</a:t>
             </a:fld>
             <a:endParaRPr lang="en-US"/>
           </a:p>
@@ -1977,7 +1977,7 @@
           <a:p>
             <a:fld id="{56B6BD69-149A-CD41-9E7C-E241C9398BA0}" type="datetimeFigureOut">
               <a:rPr lang="en-US" smtClean="0"/>
-              <a:t>4/15/2017</a:t>
+              <a:t>4/17/2017</a:t>
             </a:fld>
             <a:endParaRPr lang="en-US"/>
           </a:p>
@@ -2262,7 +2262,7 @@
           <a:p>
             <a:fld id="{56B6BD69-149A-CD41-9E7C-E241C9398BA0}" type="datetimeFigureOut">
               <a:rPr lang="en-US" smtClean="0"/>
-              <a:t>4/15/2017</a:t>
+              <a:t>4/17/2017</a:t>
             </a:fld>
             <a:endParaRPr lang="en-US"/>
           </a:p>
@@ -2686,7 +2686,7 @@
           <a:p>
             <a:fld id="{56B6BD69-149A-CD41-9E7C-E241C9398BA0}" type="datetimeFigureOut">
               <a:rPr lang="en-US" smtClean="0"/>
-              <a:t>4/15/2017</a:t>
+              <a:t>4/17/2017</a:t>
             </a:fld>
             <a:endParaRPr lang="en-US"/>
           </a:p>
@@ -2803,7 +2803,7 @@
           <a:p>
             <a:fld id="{56B6BD69-149A-CD41-9E7C-E241C9398BA0}" type="datetimeFigureOut">
               <a:rPr lang="en-US" smtClean="0"/>
-              <a:t>4/15/2017</a:t>
+              <a:t>4/17/2017</a:t>
             </a:fld>
             <a:endParaRPr lang="en-US"/>
           </a:p>
@@ -2898,7 +2898,7 @@
           <a:p>
             <a:fld id="{56B6BD69-149A-CD41-9E7C-E241C9398BA0}" type="datetimeFigureOut">
               <a:rPr lang="en-US" smtClean="0"/>
-              <a:t>4/15/2017</a:t>
+              <a:t>4/17/2017</a:t>
             </a:fld>
             <a:endParaRPr lang="en-US"/>
           </a:p>
@@ -3173,7 +3173,7 @@
           <a:p>
             <a:fld id="{56B6BD69-149A-CD41-9E7C-E241C9398BA0}" type="datetimeFigureOut">
               <a:rPr lang="en-US" smtClean="0"/>
-              <a:t>4/15/2017</a:t>
+              <a:t>4/17/2017</a:t>
             </a:fld>
             <a:endParaRPr lang="en-US"/>
           </a:p>
@@ -3428,7 +3428,7 @@
           <a:p>
             <a:fld id="{56B6BD69-149A-CD41-9E7C-E241C9398BA0}" type="datetimeFigureOut">
               <a:rPr lang="en-US" smtClean="0"/>
-              <a:t>4/15/2017</a:t>
+              <a:t>4/17/2017</a:t>
             </a:fld>
             <a:endParaRPr lang="en-US"/>
           </a:p>
@@ -3640,7 +3640,7 @@
           <a:p>
             <a:fld id="{56B6BD69-149A-CD41-9E7C-E241C9398BA0}" type="datetimeFigureOut">
               <a:rPr lang="en-US" smtClean="0"/>
-              <a:t>4/15/2017</a:t>
+              <a:t>4/17/2017</a:t>
             </a:fld>
             <a:endParaRPr lang="en-US"/>
           </a:p>
@@ -4126,7 +4126,7 @@
         <p:spPr>
           <a:xfrm>
             <a:off x="12460433" y="4266842"/>
-            <a:ext cx="9222475" cy="21074627"/>
+            <a:ext cx="9222475" cy="22855992"/>
           </a:xfrm>
           <a:prstGeom prst="rect">
             <a:avLst/>
@@ -4161,7 +4161,7 @@
             </a:pPr>
             <a:r>
               <a:rPr lang="en-US" sz="3000" dirty="0"/>
-              <a:t>For the rover’s GPS Navigation functions, we are using an algorithm that determines the shortest path between two given GPS coordinates. The GPS will also keep updating new best routes per request from obstacle avoidance and unstack functions. Which means that the GPS function has to work flawlessly with both of these two functions to ensure the rover’s safety and efficiency. How rover behaves during its driving is also critical, the GPS function will check if the rover is off-course by preset time interval and give route compensation if needed.  </a:t>
+              <a:t>For the rover’s GPS Navigation functions, we are using an algorithm that determines the shortest path between two given GPS coordinates. The GPS will also keep updating the new best route per request from the obstacle avoidance and unstuck from obstacles modules. This means that the GPS function has to work flawlessly with both of these modules to ensure the rover’s safety and efficiency. How the rover behaves during it’s driving is also critical, so the GPS function will check if the rover is off-course every few seconds and give route compensation if needed.  </a:t>
             </a:r>
           </a:p>
           <a:p>
@@ -4188,7 +4188,7 @@
             </a:pPr>
             <a:r>
               <a:rPr lang="en-US" sz="3000" dirty="0"/>
-              <a:t>The obstacle avoidance system ensures that our rover is not impeded on its way to the destination. Taking in filtered images from the obstacle detection software, this system does edge detection on the image find objects in the rovers path, and then decides how to best get around the object. This is done by treating the filtered black and white image as a matrix of pixels, and summing the number of edges to the left, right or in front of the rover and adjusting the direction of the rover to travel where the fewest edges are found.</a:t>
+              <a:t>The obstacle avoidance system ensures that our rover is not impeded on its way to the destination. Taking in filtered images from the obstacle detection software, this system does edge detection on the image to find objects in the rovers path, and then decides how to best get around the object. This is done by treating the filtered black and white image as a matrix of pixels, and summing the number of edges to the left, right or in front of the rover and adjusting the direction of the rover to travel where the fewest edges are found.</a:t>
             </a:r>
           </a:p>
           <a:p>
@@ -4242,7 +4242,7 @@
             </a:pPr>
             <a:r>
               <a:rPr lang="en-US" sz="3000" dirty="0"/>
-              <a:t>Once the rover get’s within the GPS’ error range of the finish coordinates, we have to search for the finish pole. This algorithm works by first searching for the finish pole by rotating in place and taking pictures, then aligning the rover in the direction of the finish, and moving forward, making periodic course corrections along the way. </a:t>
+              <a:t>Once the rover get’s within the GPS’ error range of the finish coordinates, we have to search for the finish pole. This algorithm works by first searching for the finish pole by rotating in place and taking pictures. These pictures are used to detect a traffic cone by our imaging system. Once the cone is detected, the rover is oriented in the direction of the cone, and moves forward, making periodic course corrections along the way. </a:t>
             </a:r>
           </a:p>
         </p:txBody>
@@ -5197,7 +5197,7 @@
         </p:blipFill>
         <p:spPr>
           <a:xfrm>
-            <a:off x="13638445" y="26425943"/>
+            <a:off x="13638445" y="27122834"/>
             <a:ext cx="8044354" cy="4579557"/>
           </a:xfrm>
           <a:prstGeom prst="rect">

</xml_diff>

<commit_message>
added AIAA info to poster
</commit_message>
<xml_diff>
--- a/docs/Poster/postertemplate2.pptx
+++ b/docs/Poster/postertemplate2.pptx
@@ -238,7 +238,7 @@
           <a:p>
             <a:fld id="{7395F848-6DDA-9042-95D4-0071278BB24B}" type="datetimeFigureOut">
               <a:rPr lang="en-US" smtClean="0"/>
-              <a:t>4/21/2017</a:t>
+              <a:t>4/23/2017</a:t>
             </a:fld>
             <a:endParaRPr lang="en-US"/>
           </a:p>
@@ -1386,7 +1386,7 @@
           <a:p>
             <a:fld id="{56B6BD69-149A-CD41-9E7C-E241C9398BA0}" type="datetimeFigureOut">
               <a:rPr lang="en-US" smtClean="0"/>
-              <a:t>4/21/2017</a:t>
+              <a:t>4/23/2017</a:t>
             </a:fld>
             <a:endParaRPr lang="en-US"/>
           </a:p>
@@ -1564,7 +1564,7 @@
           <a:p>
             <a:fld id="{56B6BD69-149A-CD41-9E7C-E241C9398BA0}" type="datetimeFigureOut">
               <a:rPr lang="en-US" smtClean="0"/>
-              <a:t>4/21/2017</a:t>
+              <a:t>4/23/2017</a:t>
             </a:fld>
             <a:endParaRPr lang="en-US"/>
           </a:p>
@@ -1732,7 +1732,7 @@
           <a:p>
             <a:fld id="{56B6BD69-149A-CD41-9E7C-E241C9398BA0}" type="datetimeFigureOut">
               <a:rPr lang="en-US" smtClean="0"/>
-              <a:t>4/21/2017</a:t>
+              <a:t>4/23/2017</a:t>
             </a:fld>
             <a:endParaRPr lang="en-US"/>
           </a:p>
@@ -1977,7 +1977,7 @@
           <a:p>
             <a:fld id="{56B6BD69-149A-CD41-9E7C-E241C9398BA0}" type="datetimeFigureOut">
               <a:rPr lang="en-US" smtClean="0"/>
-              <a:t>4/21/2017</a:t>
+              <a:t>4/23/2017</a:t>
             </a:fld>
             <a:endParaRPr lang="en-US"/>
           </a:p>
@@ -2262,7 +2262,7 @@
           <a:p>
             <a:fld id="{56B6BD69-149A-CD41-9E7C-E241C9398BA0}" type="datetimeFigureOut">
               <a:rPr lang="en-US" smtClean="0"/>
-              <a:t>4/21/2017</a:t>
+              <a:t>4/23/2017</a:t>
             </a:fld>
             <a:endParaRPr lang="en-US"/>
           </a:p>
@@ -2686,7 +2686,7 @@
           <a:p>
             <a:fld id="{56B6BD69-149A-CD41-9E7C-E241C9398BA0}" type="datetimeFigureOut">
               <a:rPr lang="en-US" smtClean="0"/>
-              <a:t>4/21/2017</a:t>
+              <a:t>4/23/2017</a:t>
             </a:fld>
             <a:endParaRPr lang="en-US"/>
           </a:p>
@@ -2803,7 +2803,7 @@
           <a:p>
             <a:fld id="{56B6BD69-149A-CD41-9E7C-E241C9398BA0}" type="datetimeFigureOut">
               <a:rPr lang="en-US" smtClean="0"/>
-              <a:t>4/21/2017</a:t>
+              <a:t>4/23/2017</a:t>
             </a:fld>
             <a:endParaRPr lang="en-US"/>
           </a:p>
@@ -2898,7 +2898,7 @@
           <a:p>
             <a:fld id="{56B6BD69-149A-CD41-9E7C-E241C9398BA0}" type="datetimeFigureOut">
               <a:rPr lang="en-US" smtClean="0"/>
-              <a:t>4/21/2017</a:t>
+              <a:t>4/23/2017</a:t>
             </a:fld>
             <a:endParaRPr lang="en-US"/>
           </a:p>
@@ -3173,7 +3173,7 @@
           <a:p>
             <a:fld id="{56B6BD69-149A-CD41-9E7C-E241C9398BA0}" type="datetimeFigureOut">
               <a:rPr lang="en-US" smtClean="0"/>
-              <a:t>4/21/2017</a:t>
+              <a:t>4/23/2017</a:t>
             </a:fld>
             <a:endParaRPr lang="en-US"/>
           </a:p>
@@ -3428,7 +3428,7 @@
           <a:p>
             <a:fld id="{56B6BD69-149A-CD41-9E7C-E241C9398BA0}" type="datetimeFigureOut">
               <a:rPr lang="en-US" smtClean="0"/>
-              <a:t>4/21/2017</a:t>
+              <a:t>4/23/2017</a:t>
             </a:fld>
             <a:endParaRPr lang="en-US"/>
           </a:p>
@@ -3640,7 +3640,7 @@
           <a:p>
             <a:fld id="{56B6BD69-149A-CD41-9E7C-E241C9398BA0}" type="datetimeFigureOut">
               <a:rPr lang="en-US" smtClean="0"/>
-              <a:t>4/21/2017</a:t>
+              <a:t>4/23/2017</a:t>
             </a:fld>
             <a:endParaRPr lang="en-US"/>
           </a:p>
@@ -4107,19 +4107,7 @@
             </a:pPr>
             <a:r>
               <a:rPr lang="en-US" sz="12000" dirty="0"/>
-              <a:t>Several points from the result, i.e. pixels, are converted to their HSV (Hue, Saturation &amp; Value) equivalent, and are compared to values which would be typically observed on an orange traffic cone. Without the HSV values </a:t>
-            </a:r>
-            <a:r>
-              <a:rPr lang="en-US" sz="12000" dirty="0" smtClean="0"/>
-              <a:t>being</a:t>
-            </a:r>
-            <a:r>
-              <a:rPr lang="en-US" sz="12000" dirty="0" smtClean="0"/>
-              <a:t> </a:t>
-            </a:r>
-            <a:r>
-              <a:rPr lang="en-US" sz="12000" dirty="0"/>
-              <a:t>confirmed, the image is rejected. This results in a higher rate of false negatives, but ensures accurate results.</a:t>
+              <a:t>Several points from the result, i.e. pixels, are converted to their HSV (Hue, Saturation &amp; Value) equivalent, and are compared to values which would be typically observed on an orange traffic cone. Without the HSV values being confirmed, the image is rejected. This results in a higher rate of false negatives, but ensures accurate results.</a:t>
             </a:r>
             <a:endParaRPr lang="en-US" sz="12000" dirty="0">
               <a:solidFill>
@@ -4398,15 +4386,7 @@
             </a:pPr>
             <a:r>
               <a:rPr lang="en-US" sz="3000" dirty="0"/>
-              <a:t>Working alongside Electrical and Mechanical Engineering capstone teams, our task was to design and build a small rover that fits inside a standard 12 oz. soda can. This rover will be dropped from a rocket at 12,000’ AGL, land safely on the ground </a:t>
-            </a:r>
-            <a:r>
-              <a:rPr lang="en-US" sz="3000" dirty="0" smtClean="0"/>
-              <a:t>and </a:t>
-            </a:r>
-            <a:r>
-              <a:rPr lang="en-US" sz="3000" dirty="0"/>
-              <a:t>drive itself to a predetermined set of GPS coordinates.</a:t>
+              <a:t>Working alongside Electrical and Mechanical Engineering capstone teams, our task was to design and build a small rover that fits inside a standard 12 oz. soda can. This rover will be dropped from a rocket at 12,000’ AGL, land safely on the ground and drive itself to a predetermined set of GPS coordinates.</a:t>
             </a:r>
           </a:p>
           <a:p>
@@ -4417,21 +4397,8 @@
             </a:pPr>
             <a:r>
               <a:rPr lang="en-US" sz="3000" dirty="0"/>
-              <a:t>As the Computer Science team, our job was to develop the software package for the rover. This included being able to lock on to and drive towards the GPS coordinates, as well </a:t>
-            </a:r>
-            <a:r>
-              <a:rPr lang="en-US" sz="3000" dirty="0" smtClean="0"/>
-              <a:t>as, </a:t>
-            </a:r>
-            <a:r>
-              <a:rPr lang="en-US" sz="3000" dirty="0"/>
-              <a:t>an obstacle avoidance system that uses a camera to detect and avoid rough terrain or objects such as rocks that </a:t>
-            </a:r>
-            <a:r>
-              <a:rPr lang="en-US" sz="3000" dirty="0" smtClean="0"/>
-              <a:t>are in the path of our rover.</a:t>
-            </a:r>
-            <a:endParaRPr lang="en-US" sz="3000" dirty="0"/>
+              <a:t>As the Computer Science team, our job was to develop the software package for the rover. This included being able to lock on to and drive towards the GPS coordinates, as well as, an obstacle avoidance system that uses a camera to detect and avoid rough terrain or objects such as rocks that are in the path of our rover.</a:t>
+            </a:r>
           </a:p>
           <a:p>
             <a:pPr>
@@ -4676,23 +4643,7 @@
                   <a:srgbClr val="F37321"/>
                 </a:solidFill>
               </a:rPr>
-              <a:t>What it is </a:t>
-            </a:r>
-            <a:r>
-              <a:rPr lang="en-US" sz="5400" dirty="0" smtClean="0">
-                <a:solidFill>
-                  <a:srgbClr val="F37321"/>
-                </a:solidFill>
-              </a:rPr>
-              <a:t>and </a:t>
-            </a:r>
-            <a:r>
-              <a:rPr lang="en-US" sz="5400" dirty="0">
-                <a:solidFill>
-                  <a:srgbClr val="F37321"/>
-                </a:solidFill>
-              </a:rPr>
-              <a:t>how we did it</a:t>
+              <a:t>What it is and how we did it</a:t>
             </a:r>
           </a:p>
         </p:txBody>
@@ -5141,7 +5092,23 @@
                   <a:schemeClr val="bg1"/>
                 </a:solidFill>
               </a:rPr>
-              <a:t>This project was made possible through funding provided by Oregon State University AIAA</a:t>
+              <a:t>This project was made possible through funding provided by Oregon State University AIAA. To find out more about AIAA, follow the QR code </a:t>
+            </a:r>
+            <a:r>
+              <a:rPr lang="en-US" sz="3000">
+                <a:solidFill>
+                  <a:schemeClr val="bg1"/>
+                </a:solidFill>
+              </a:rPr>
+              <a:t>or visit </a:t>
+            </a:r>
+            <a:r>
+              <a:rPr lang="en-US" sz="3000" dirty="0">
+                <a:solidFill>
+                  <a:schemeClr val="bg1"/>
+                </a:solidFill>
+              </a:rPr>
+              <a:t>http://groups.engr.oregonstate.edu/aiaa/home</a:t>
             </a:r>
           </a:p>
         </p:txBody>
@@ -5225,15 +5192,7 @@
             </a:pPr>
             <a:r>
               <a:rPr lang="en-US" sz="2400" dirty="0"/>
-              <a:t>Image 1 shows the original image. Image 2 shows the image after it has been converted to grayscale. Image 3 shows the image after it has been smoothed. </a:t>
-            </a:r>
-            <a:r>
-              <a:rPr lang="en-US" sz="2400" dirty="0" smtClean="0"/>
-              <a:t>Image 4 </a:t>
-            </a:r>
-            <a:r>
-              <a:rPr lang="en-US" sz="2400" dirty="0"/>
-              <a:t>shows the image after the Canny filter has been applied.</a:t>
+              <a:t>Image 1 shows the original image. Image 2 shows the image after it has been converted to grayscale. Image 3 shows the image after it has been smoothed. Image 4 shows the image after the Canny filter has been applied.</a:t>
             </a:r>
           </a:p>
         </p:txBody>
@@ -5256,6 +5215,30 @@
           <a:xfrm>
             <a:off x="13638445" y="27122834"/>
             <a:ext cx="8044354" cy="4579557"/>
+          </a:xfrm>
+          <a:prstGeom prst="rect">
+            <a:avLst/>
+          </a:prstGeom>
+        </p:spPr>
+      </p:pic>
+      <p:pic>
+        <p:nvPicPr>
+          <p:cNvPr id="6" name="Picture 5"/>
+          <p:cNvPicPr>
+            <a:picLocks noChangeAspect="1"/>
+          </p:cNvPicPr>
+          <p:nvPr/>
+        </p:nvPicPr>
+        <p:blipFill>
+          <a:blip r:embed="rId6"/>
+          <a:stretch>
+            <a:fillRect/>
+          </a:stretch>
+        </p:blipFill>
+        <p:spPr>
+          <a:xfrm>
+            <a:off x="37202861" y="24714737"/>
+            <a:ext cx="2408097" cy="2408097"/>
           </a:xfrm>
           <a:prstGeom prst="rect">
             <a:avLst/>

</xml_diff>